<commit_message>
spelling change - poster
</commit_message>
<xml_diff>
--- a/Bar_GPT/poster.pptx
+++ b/Bar_GPT/poster.pptx
@@ -213,7 +213,7 @@
           <a:p>
             <a:fld id="{5A72C2B9-F223-D740-BE68-ED5F656D5CCD}" type="datetimeFigureOut">
               <a:rPr lang="en-US" smtClean="0"/>
-              <a:t>7/26/23</a:t>
+              <a:t>7/27/23</a:t>
             </a:fld>
             <a:endParaRPr lang="en-US"/>
           </a:p>
@@ -2855,13 +2855,8 @@
           <a:p>
             <a:r>
               <a:rPr lang="de-DE" sz="3600" dirty="0"/>
-              <a:t>Karan </a:t>
-            </a:r>
-            <a:r>
-              <a:rPr lang="de-DE" sz="3600" dirty="0" err="1"/>
-              <a:t>Bhanusheli</a:t>
-            </a:r>
-            <a:endParaRPr lang="de-DE" sz="3600" dirty="0"/>
+              <a:t>Karan Bhanushali</a:t>
+            </a:r>
           </a:p>
           <a:p>
             <a:r>

</xml_diff>